<commit_message>
Added the github repository links + enhance the slides
</commit_message>
<xml_diff>
--- a/Botalyze.pptx
+++ b/Botalyze.pptx
@@ -3665,13 +3665,13 @@
   <p:clrMapOvr>
     <a:masterClrMapping/>
   </p:clrMapOvr>
-  <mc:AlternateContent xmlns:mc="http://schemas.openxmlformats.org/markup-compatibility/2006">
-    <mc:Choice xmlns:p14="http://schemas.microsoft.com/office/powerpoint/2010/main" Requires="p14">
+  <mc:AlternateContent xmlns:mc="http://schemas.openxmlformats.org/markup-compatibility/2006" xmlns:p14="http://schemas.microsoft.com/office/powerpoint/2010/main">
+    <mc:Choice Requires="p14">
       <p:transition spd="slow" p14:dur="3400">
         <p14:reveal/>
       </p:transition>
     </mc:Choice>
-    <mc:Fallback>
+    <mc:Fallback xmlns="">
       <p:transition spd="slow">
         <p:fade/>
       </p:transition>
@@ -9282,14 +9282,14 @@
         <p:spPr>
           <a:xfrm>
             <a:off x="1491137" y="6067425"/>
-            <a:ext cx="6356243" cy="3190875"/>
+            <a:ext cx="11462863" cy="3193182"/>
           </a:xfrm>
           <a:prstGeom prst="rect">
             <a:avLst/>
           </a:prstGeom>
         </p:spPr>
         <p:txBody>
-          <a:bodyPr lIns="0" tIns="0" rIns="0" bIns="0" rtlCol="0" anchor="t">
+          <a:bodyPr wrap="square" lIns="0" tIns="0" rIns="0" bIns="0" rtlCol="0" anchor="t">
             <a:spAutoFit/>
           </a:bodyPr>
           <a:lstStyle/>
@@ -9329,7 +9329,7 @@
             </a:endParaRPr>
           </a:p>
           <a:p>
-            <a:pPr algn="l">
+            <a:pPr>
               <a:lnSpc>
                 <a:spcPts val="4200"/>
               </a:lnSpc>
@@ -9345,6 +9345,30 @@
                 <a:sym typeface="Glacial Indifference Bold"/>
               </a:rPr>
               <a:t>     GitHub Repository : </a:t>
+            </a:r>
+            <a:r>
+              <a:rPr lang="en-US" sz="3000" b="1" u="sng" dirty="0">
+                <a:solidFill>
+                  <a:srgbClr val="0000FF"/>
+                </a:solidFill>
+                <a:latin typeface="Glacial Indifference Bold"/>
+                <a:ea typeface="Glacial Indifference Bold"/>
+                <a:cs typeface="Glacial Indifference Bold"/>
+                <a:sym typeface="Glacial Indifference Bold"/>
+              </a:rPr>
+              <a:t>https://github.com/Hamz16-30/Botalyze</a:t>
+            </a:r>
+            <a:r>
+              <a:rPr lang="en-US" sz="3000" b="1" dirty="0">
+                <a:solidFill>
+                  <a:srgbClr val="343434"/>
+                </a:solidFill>
+                <a:latin typeface="Glacial Indifference Bold"/>
+                <a:ea typeface="Glacial Indifference Bold"/>
+                <a:cs typeface="Glacial Indifference Bold"/>
+                <a:sym typeface="Glacial Indifference Bold"/>
+              </a:rPr>
+              <a:t> </a:t>
             </a:r>
           </a:p>
           <a:p>

</xml_diff>